<commit_message>
Updates for Eindhoven Training
</commit_message>
<xml_diff>
--- a/slides/Intro to SRIO.pptx
+++ b/slides/Intro to SRIO.pptx
@@ -391,7 +391,7 @@
             <a:pPr>
               <a:defRPr/>
             </a:pPr>
-            <a:fld id="{4BAE0793-7805-491F-B8A1-2E2FEDF8FE57}" type="slidenum">
+            <a:fld id="{0E398F16-FD28-41C7-96C6-68264F990B6A}" type="slidenum">
               <a:rPr lang="en-US"/>
               <a:pPr>
                 <a:defRPr/>
@@ -721,7 +721,7 @@
             <a:pPr>
               <a:defRPr/>
             </a:pPr>
-            <a:fld id="{E8AD19AA-3625-4EEB-8931-041B3934B28C}" type="slidenum">
+            <a:fld id="{3712B065-A3E9-43AC-8889-CCF40F95B1C4}" type="slidenum">
               <a:rPr lang="en-US"/>
               <a:pPr>
                 <a:defRPr/>
@@ -1077,7 +1077,7 @@
           <a:bodyPr/>
           <a:lstStyle/>
           <a:p>
-            <a:fld id="{A1FC88B8-2F96-4791-B4F5-1B1B905B67AD}" type="slidenum">
+            <a:fld id="{C4819F4B-838E-4EDC-AC30-663E317A84A8}" type="slidenum">
               <a:rPr lang="en-US" smtClean="0"/>
               <a:pPr/>
               <a:t>12</a:t>
@@ -1165,7 +1165,7 @@
           <a:bodyPr/>
           <a:lstStyle/>
           <a:p>
-            <a:fld id="{2C0D9A4A-A338-435C-9365-07F3C22483F5}" type="slidenum">
+            <a:fld id="{13882C4B-36BE-461E-BACF-EF861DCB8F72}" type="slidenum">
               <a:rPr lang="en-US" smtClean="0"/>
               <a:pPr/>
               <a:t>13</a:t>
@@ -1253,7 +1253,7 @@
           <a:bodyPr/>
           <a:lstStyle/>
           <a:p>
-            <a:fld id="{2E792EDC-A878-44A1-B6C5-37F4D1D4E7A8}" type="slidenum">
+            <a:fld id="{A667BF9C-176E-44C9-8AF2-CD993E49843A}" type="slidenum">
               <a:rPr lang="en-US" smtClean="0"/>
               <a:pPr/>
               <a:t>14</a:t>
@@ -1402,7 +1402,7 @@
           <a:bodyPr/>
           <a:lstStyle/>
           <a:p>
-            <a:fld id="{E4F2B1D1-0E37-411C-A88F-DEDA4C9D9C9D}" type="slidenum">
+            <a:fld id="{555D4AE8-6BE8-421F-A2B5-189892C321B3}" type="slidenum">
               <a:rPr lang="en-US" smtClean="0"/>
               <a:pPr/>
               <a:t>16</a:t>
@@ -1490,7 +1490,7 @@
           <a:bodyPr/>
           <a:lstStyle/>
           <a:p>
-            <a:fld id="{8C5A811C-9C4D-49E6-B28A-2BFC88E117CC}" type="slidenum">
+            <a:fld id="{972B2BCA-64E8-4E92-A3C3-A53477EEF2A7}" type="slidenum">
               <a:rPr lang="en-US" smtClean="0"/>
               <a:pPr/>
               <a:t>17</a:t>
@@ -1639,7 +1639,7 @@
           <a:bodyPr/>
           <a:lstStyle/>
           <a:p>
-            <a:fld id="{6CDC06F5-EF23-481F-A5BA-3953E9D1EC5F}" type="slidenum">
+            <a:fld id="{0DE32986-30B0-44C3-9BA5-500980ADE066}" type="slidenum">
               <a:rPr lang="en-US" smtClean="0"/>
               <a:pPr/>
               <a:t>19</a:t>
@@ -1788,7 +1788,7 @@
           <a:bodyPr/>
           <a:lstStyle/>
           <a:p>
-            <a:fld id="{70B0D627-50C9-4299-B5A6-42630211F840}" type="slidenum">
+            <a:fld id="{4BD0086E-C00D-4E31-92F7-92216ACC0E0B}" type="slidenum">
               <a:rPr lang="en-US" smtClean="0"/>
               <a:pPr/>
               <a:t>20</a:t>
@@ -1937,7 +1937,7 @@
           <a:bodyPr/>
           <a:lstStyle/>
           <a:p>
-            <a:fld id="{7D46FE51-C9B0-437F-8707-DB8C6D219169}" type="slidenum">
+            <a:fld id="{AD57CF80-4748-40CA-A8BF-EC8F8413461C}" type="slidenum">
               <a:rPr lang="en-US" smtClean="0"/>
               <a:pPr/>
               <a:t>22</a:t>
@@ -2086,7 +2086,7 @@
           <a:bodyPr/>
           <a:lstStyle/>
           <a:p>
-            <a:fld id="{ABC29C7E-9626-4450-8594-304682F3736B}" type="slidenum">
+            <a:fld id="{0E107E6C-7EE9-411E-A486-F7940BA04F76}" type="slidenum">
               <a:rPr lang="en-US" smtClean="0"/>
               <a:pPr/>
               <a:t>24</a:t>
@@ -2235,7 +2235,7 @@
           <a:bodyPr/>
           <a:lstStyle/>
           <a:p>
-            <a:fld id="{776A3066-3D8E-47B4-9B27-0F18D61986D3}" type="slidenum">
+            <a:fld id="{00149EC7-C30E-4FE6-81EC-BE80F616A25A}" type="slidenum">
               <a:rPr lang="en-US" smtClean="0"/>
               <a:pPr/>
               <a:t>26</a:t>
@@ -2872,7 +2872,7 @@
           <a:bodyPr/>
           <a:lstStyle/>
           <a:p>
-            <a:fld id="{02FBCA90-BED7-4C89-A529-3F6405F1738F}" type="slidenum">
+            <a:fld id="{0A8AE094-FE6D-4E50-8D02-D356A74E11CD}" type="slidenum">
               <a:rPr lang="en-US" smtClean="0"/>
               <a:pPr/>
               <a:t>5</a:t>
@@ -2960,7 +2960,7 @@
           <a:bodyPr/>
           <a:lstStyle/>
           <a:p>
-            <a:fld id="{0792D028-C0C4-48DB-A6F3-F6D12A570CAB}" type="slidenum">
+            <a:fld id="{F058F59C-E4DC-498C-9D29-367FA80C03D5}" type="slidenum">
               <a:rPr lang="en-US" smtClean="0"/>
               <a:pPr/>
               <a:t>6</a:t>
@@ -3547,7 +3547,7 @@
             <a:pPr>
               <a:defRPr/>
             </a:pPr>
-            <a:fld id="{AFE142D5-DA38-4FB2-B9C2-7AA6E1CEBBCE}" type="slidenum">
+            <a:fld id="{B7A08B5B-2320-4691-A7DF-24003A785B95}" type="slidenum">
               <a:rPr lang="en-US"/>
               <a:pPr>
                 <a:defRPr/>
@@ -3757,7 +3757,7 @@
             <a:pPr>
               <a:defRPr/>
             </a:pPr>
-            <a:fld id="{8D9F5B4C-96A4-4E44-9F08-B46598DA0C66}" type="slidenum">
+            <a:fld id="{D197FC4B-4A99-400F-A629-CB8D47B73344}" type="slidenum">
               <a:rPr lang="en-US"/>
               <a:pPr>
                 <a:defRPr/>
@@ -3967,7 +3967,7 @@
             <a:pPr>
               <a:defRPr/>
             </a:pPr>
-            <a:fld id="{57638FD9-2622-464D-9712-E1DC64CA084C}" type="slidenum">
+            <a:fld id="{C65834EC-ADFD-4A91-9FD9-DC7026E7EB99}" type="slidenum">
               <a:rPr lang="en-US"/>
               <a:pPr>
                 <a:defRPr/>
@@ -4088,7 +4088,7 @@
             <a:pPr>
               <a:defRPr/>
             </a:pPr>
-            <a:fld id="{8BE77CAE-FE8F-45A2-88A8-EF85F999522B}" type="slidenum">
+            <a:fld id="{1C7E9991-8913-499C-AF86-B2D8BDD96134}" type="slidenum">
               <a:rPr lang="en-US"/>
               <a:pPr>
                 <a:defRPr/>

</xml_diff>

<commit_message>
Ran test check in
</commit_message>
<xml_diff>
--- a/slides/Intro to SRIO.pptx
+++ b/slides/Intro to SRIO.pptx
@@ -533,7 +533,7 @@
         <p:nvSpPr>
           <p:cNvPr id="40964" name="Rectangle 4"/>
           <p:cNvSpPr>
-            <a:spLocks noRot="1" noChangeArrowheads="1" noTextEdit="1"/>
+            <a:spLocks noGrp="1" noRot="1" noChangeAspect="1" noChangeArrowheads="1" noTextEdit="1"/>
           </p:cNvSpPr>
           <p:nvPr>
             <p:ph type="sldImg" idx="2"/>
@@ -881,7 +881,7 @@
         <p:nvSpPr>
           <p:cNvPr id="41986" name="Rectangle 2"/>
           <p:cNvSpPr>
-            <a:spLocks noRot="1" noChangeArrowheads="1" noTextEdit="1"/>
+            <a:spLocks noGrp="1" noRot="1" noChangeAspect="1" noChangeArrowheads="1" noTextEdit="1"/>
           </p:cNvSpPr>
           <p:nvPr>
             <p:ph type="sldImg"/>
@@ -942,7 +942,7 @@
         <p:nvSpPr>
           <p:cNvPr id="51202" name="Rectangle 2"/>
           <p:cNvSpPr>
-            <a:spLocks noRot="1" noChangeArrowheads="1" noTextEdit="1"/>
+            <a:spLocks noGrp="1" noRot="1" noChangeAspect="1" noChangeArrowheads="1" noTextEdit="1"/>
           </p:cNvSpPr>
           <p:nvPr>
             <p:ph type="sldImg"/>
@@ -1003,7 +1003,7 @@
         <p:nvSpPr>
           <p:cNvPr id="52226" name="Rectangle 2"/>
           <p:cNvSpPr>
-            <a:spLocks noRot="1" noChangeArrowheads="1" noTextEdit="1"/>
+            <a:spLocks noGrp="1" noRot="1" noChangeAspect="1" noChangeArrowheads="1" noTextEdit="1"/>
           </p:cNvSpPr>
           <p:nvPr>
             <p:ph type="sldImg"/>
@@ -1090,7 +1090,7 @@
         <p:nvSpPr>
           <p:cNvPr id="53251" name="Rectangle 2"/>
           <p:cNvSpPr>
-            <a:spLocks noRot="1" noChangeArrowheads="1" noTextEdit="1"/>
+            <a:spLocks noGrp="1" noRot="1" noChangeAspect="1" noChangeArrowheads="1" noTextEdit="1"/>
           </p:cNvSpPr>
           <p:nvPr>
             <p:ph type="sldImg"/>
@@ -1178,7 +1178,7 @@
         <p:nvSpPr>
           <p:cNvPr id="54275" name="Rectangle 2"/>
           <p:cNvSpPr>
-            <a:spLocks noRot="1" noChangeArrowheads="1" noTextEdit="1"/>
+            <a:spLocks noGrp="1" noRot="1" noChangeAspect="1" noChangeArrowheads="1" noTextEdit="1"/>
           </p:cNvSpPr>
           <p:nvPr>
             <p:ph type="sldImg"/>
@@ -1266,7 +1266,7 @@
         <p:nvSpPr>
           <p:cNvPr id="55299" name="Rectangle 2"/>
           <p:cNvSpPr>
-            <a:spLocks noRot="1" noChangeArrowheads="1" noTextEdit="1"/>
+            <a:spLocks noGrp="1" noRot="1" noChangeAspect="1" noChangeArrowheads="1" noTextEdit="1"/>
           </p:cNvSpPr>
           <p:nvPr>
             <p:ph type="sldImg"/>
@@ -1328,7 +1328,7 @@
         <p:nvSpPr>
           <p:cNvPr id="56322" name="Rectangle 2"/>
           <p:cNvSpPr>
-            <a:spLocks noRot="1" noChangeArrowheads="1" noTextEdit="1"/>
+            <a:spLocks noGrp="1" noRot="1" noChangeAspect="1" noChangeArrowheads="1" noTextEdit="1"/>
           </p:cNvSpPr>
           <p:nvPr>
             <p:ph type="sldImg"/>
@@ -1415,7 +1415,7 @@
         <p:nvSpPr>
           <p:cNvPr id="57347" name="Rectangle 2"/>
           <p:cNvSpPr>
-            <a:spLocks noRot="1" noChangeArrowheads="1" noTextEdit="1"/>
+            <a:spLocks noGrp="1" noRot="1" noChangeAspect="1" noChangeArrowheads="1" noTextEdit="1"/>
           </p:cNvSpPr>
           <p:nvPr>
             <p:ph type="sldImg"/>
@@ -1503,7 +1503,7 @@
         <p:nvSpPr>
           <p:cNvPr id="58371" name="Rectangle 2"/>
           <p:cNvSpPr>
-            <a:spLocks noRot="1" noChangeArrowheads="1" noTextEdit="1"/>
+            <a:spLocks noGrp="1" noRot="1" noChangeAspect="1" noChangeArrowheads="1" noTextEdit="1"/>
           </p:cNvSpPr>
           <p:nvPr>
             <p:ph type="sldImg"/>
@@ -1565,7 +1565,7 @@
         <p:nvSpPr>
           <p:cNvPr id="59394" name="Rectangle 2"/>
           <p:cNvSpPr>
-            <a:spLocks noRot="1" noChangeArrowheads="1" noTextEdit="1"/>
+            <a:spLocks noGrp="1" noRot="1" noChangeAspect="1" noChangeArrowheads="1" noTextEdit="1"/>
           </p:cNvSpPr>
           <p:nvPr>
             <p:ph type="sldImg"/>
@@ -1652,7 +1652,7 @@
         <p:nvSpPr>
           <p:cNvPr id="60419" name="Rectangle 2"/>
           <p:cNvSpPr>
-            <a:spLocks noRot="1" noChangeArrowheads="1" noTextEdit="1"/>
+            <a:spLocks noGrp="1" noRot="1" noChangeAspect="1" noChangeArrowheads="1" noTextEdit="1"/>
           </p:cNvSpPr>
           <p:nvPr>
             <p:ph type="sldImg"/>
@@ -1714,7 +1714,7 @@
         <p:nvSpPr>
           <p:cNvPr id="43010" name="Rectangle 2"/>
           <p:cNvSpPr>
-            <a:spLocks noRot="1" noChangeArrowheads="1" noTextEdit="1"/>
+            <a:spLocks noGrp="1" noRot="1" noChangeAspect="1" noChangeArrowheads="1" noTextEdit="1"/>
           </p:cNvSpPr>
           <p:nvPr>
             <p:ph type="sldImg"/>
@@ -1801,7 +1801,7 @@
         <p:nvSpPr>
           <p:cNvPr id="61443" name="Rectangle 2"/>
           <p:cNvSpPr>
-            <a:spLocks noRot="1" noChangeArrowheads="1" noTextEdit="1"/>
+            <a:spLocks noGrp="1" noRot="1" noChangeAspect="1" noChangeArrowheads="1" noTextEdit="1"/>
           </p:cNvSpPr>
           <p:nvPr>
             <p:ph type="sldImg"/>
@@ -1863,7 +1863,7 @@
         <p:nvSpPr>
           <p:cNvPr id="62466" name="Rectangle 2"/>
           <p:cNvSpPr>
-            <a:spLocks noRot="1" noChangeArrowheads="1" noTextEdit="1"/>
+            <a:spLocks noGrp="1" noRot="1" noChangeAspect="1" noChangeArrowheads="1" noTextEdit="1"/>
           </p:cNvSpPr>
           <p:nvPr>
             <p:ph type="sldImg"/>
@@ -1950,7 +1950,7 @@
         <p:nvSpPr>
           <p:cNvPr id="63491" name="Rectangle 2"/>
           <p:cNvSpPr>
-            <a:spLocks noRot="1" noChangeArrowheads="1" noTextEdit="1"/>
+            <a:spLocks noGrp="1" noRot="1" noChangeAspect="1" noChangeArrowheads="1" noTextEdit="1"/>
           </p:cNvSpPr>
           <p:nvPr>
             <p:ph type="sldImg"/>
@@ -2012,7 +2012,7 @@
         <p:nvSpPr>
           <p:cNvPr id="64514" name="Rectangle 2"/>
           <p:cNvSpPr>
-            <a:spLocks noRot="1" noChangeArrowheads="1" noTextEdit="1"/>
+            <a:spLocks noGrp="1" noRot="1" noChangeAspect="1" noChangeArrowheads="1" noTextEdit="1"/>
           </p:cNvSpPr>
           <p:nvPr>
             <p:ph type="sldImg"/>
@@ -2099,7 +2099,7 @@
         <p:nvSpPr>
           <p:cNvPr id="65539" name="Rectangle 2"/>
           <p:cNvSpPr>
-            <a:spLocks noRot="1" noChangeArrowheads="1" noTextEdit="1"/>
+            <a:spLocks noGrp="1" noRot="1" noChangeAspect="1" noChangeArrowheads="1" noTextEdit="1"/>
           </p:cNvSpPr>
           <p:nvPr>
             <p:ph type="sldImg"/>
@@ -2161,7 +2161,7 @@
         <p:nvSpPr>
           <p:cNvPr id="66562" name="Rectangle 2"/>
           <p:cNvSpPr>
-            <a:spLocks noRot="1" noChangeArrowheads="1" noTextEdit="1"/>
+            <a:spLocks noGrp="1" noRot="1" noChangeAspect="1" noChangeArrowheads="1" noTextEdit="1"/>
           </p:cNvSpPr>
           <p:nvPr>
             <p:ph type="sldImg"/>
@@ -2248,7 +2248,7 @@
         <p:nvSpPr>
           <p:cNvPr id="67587" name="Rectangle 2"/>
           <p:cNvSpPr>
-            <a:spLocks noRot="1" noChangeArrowheads="1" noTextEdit="1"/>
+            <a:spLocks noGrp="1" noRot="1" noChangeAspect="1" noChangeArrowheads="1" noTextEdit="1"/>
           </p:cNvSpPr>
           <p:nvPr>
             <p:ph type="sldImg"/>
@@ -2310,7 +2310,7 @@
         <p:nvSpPr>
           <p:cNvPr id="68610" name="Rectangle 2"/>
           <p:cNvSpPr>
-            <a:spLocks noRot="1" noChangeArrowheads="1" noTextEdit="1"/>
+            <a:spLocks noGrp="1" noRot="1" noChangeAspect="1" noChangeArrowheads="1" noTextEdit="1"/>
           </p:cNvSpPr>
           <p:nvPr>
             <p:ph type="sldImg"/>
@@ -2371,7 +2371,7 @@
         <p:nvSpPr>
           <p:cNvPr id="69634" name="Rectangle 2"/>
           <p:cNvSpPr>
-            <a:spLocks noRot="1" noChangeArrowheads="1" noTextEdit="1"/>
+            <a:spLocks noGrp="1" noRot="1" noChangeAspect="1" noChangeArrowheads="1" noTextEdit="1"/>
           </p:cNvSpPr>
           <p:nvPr>
             <p:ph type="sldImg"/>
@@ -2432,7 +2432,7 @@
         <p:nvSpPr>
           <p:cNvPr id="70658" name="Rectangle 2"/>
           <p:cNvSpPr>
-            <a:spLocks noRot="1" noChangeArrowheads="1" noTextEdit="1"/>
+            <a:spLocks noGrp="1" noRot="1" noChangeAspect="1" noChangeArrowheads="1" noTextEdit="1"/>
           </p:cNvSpPr>
           <p:nvPr>
             <p:ph type="sldImg"/>
@@ -2493,7 +2493,7 @@
         <p:nvSpPr>
           <p:cNvPr id="44034" name="Rectangle 2"/>
           <p:cNvSpPr>
-            <a:spLocks noRot="1" noChangeArrowheads="1" noTextEdit="1"/>
+            <a:spLocks noGrp="1" noRot="1" noChangeAspect="1" noChangeArrowheads="1" noTextEdit="1"/>
           </p:cNvSpPr>
           <p:nvPr>
             <p:ph type="sldImg"/>
@@ -2554,7 +2554,7 @@
         <p:nvSpPr>
           <p:cNvPr id="71682" name="Rectangle 2"/>
           <p:cNvSpPr>
-            <a:spLocks noRot="1" noChangeArrowheads="1" noTextEdit="1"/>
+            <a:spLocks noGrp="1" noRot="1" noChangeAspect="1" noChangeArrowheads="1" noTextEdit="1"/>
           </p:cNvSpPr>
           <p:nvPr>
             <p:ph type="sldImg"/>
@@ -2615,7 +2615,7 @@
         <p:nvSpPr>
           <p:cNvPr id="72706" name="Rectangle 2"/>
           <p:cNvSpPr>
-            <a:spLocks noRot="1" noChangeArrowheads="1" noTextEdit="1"/>
+            <a:spLocks noGrp="1" noRot="1" noChangeAspect="1" noChangeArrowheads="1" noTextEdit="1"/>
           </p:cNvSpPr>
           <p:nvPr>
             <p:ph type="sldImg"/>
@@ -2676,7 +2676,7 @@
         <p:nvSpPr>
           <p:cNvPr id="73730" name="Rectangle 2"/>
           <p:cNvSpPr>
-            <a:spLocks noRot="1" noChangeArrowheads="1" noTextEdit="1"/>
+            <a:spLocks noGrp="1" noRot="1" noChangeAspect="1" noChangeArrowheads="1" noTextEdit="1"/>
           </p:cNvSpPr>
           <p:nvPr>
             <p:ph type="sldImg"/>
@@ -2737,7 +2737,7 @@
         <p:nvSpPr>
           <p:cNvPr id="74754" name="Rectangle 2"/>
           <p:cNvSpPr>
-            <a:spLocks noRot="1" noChangeArrowheads="1" noTextEdit="1"/>
+            <a:spLocks noGrp="1" noRot="1" noChangeAspect="1" noChangeArrowheads="1" noTextEdit="1"/>
           </p:cNvSpPr>
           <p:nvPr>
             <p:ph type="sldImg"/>
@@ -2798,7 +2798,7 @@
         <p:nvSpPr>
           <p:cNvPr id="45058" name="Rectangle 2"/>
           <p:cNvSpPr>
-            <a:spLocks noRot="1" noChangeArrowheads="1" noTextEdit="1"/>
+            <a:spLocks noGrp="1" noRot="1" noChangeAspect="1" noChangeArrowheads="1" noTextEdit="1"/>
           </p:cNvSpPr>
           <p:nvPr>
             <p:ph type="sldImg"/>
@@ -2885,7 +2885,7 @@
         <p:nvSpPr>
           <p:cNvPr id="46083" name="Rectangle 2"/>
           <p:cNvSpPr>
-            <a:spLocks noRot="1" noChangeArrowheads="1" noTextEdit="1"/>
+            <a:spLocks noGrp="1" noRot="1" noChangeAspect="1" noChangeArrowheads="1" noTextEdit="1"/>
           </p:cNvSpPr>
           <p:nvPr>
             <p:ph type="sldImg"/>
@@ -2973,7 +2973,7 @@
         <p:nvSpPr>
           <p:cNvPr id="47107" name="Rectangle 2"/>
           <p:cNvSpPr>
-            <a:spLocks noRot="1" noChangeArrowheads="1" noTextEdit="1"/>
+            <a:spLocks noGrp="1" noRot="1" noChangeAspect="1" noChangeArrowheads="1" noTextEdit="1"/>
           </p:cNvSpPr>
           <p:nvPr>
             <p:ph type="sldImg"/>
@@ -3035,7 +3035,7 @@
         <p:nvSpPr>
           <p:cNvPr id="48130" name="Rectangle 2"/>
           <p:cNvSpPr>
-            <a:spLocks noRot="1" noChangeArrowheads="1" noTextEdit="1"/>
+            <a:spLocks noGrp="1" noRot="1" noChangeAspect="1" noChangeArrowheads="1" noTextEdit="1"/>
           </p:cNvSpPr>
           <p:nvPr>
             <p:ph type="sldImg"/>
@@ -3096,7 +3096,7 @@
         <p:nvSpPr>
           <p:cNvPr id="49154" name="Rectangle 2"/>
           <p:cNvSpPr>
-            <a:spLocks noRot="1" noChangeArrowheads="1" noTextEdit="1"/>
+            <a:spLocks noGrp="1" noRot="1" noChangeAspect="1" noChangeArrowheads="1" noTextEdit="1"/>
           </p:cNvSpPr>
           <p:nvPr>
             <p:ph type="sldImg"/>
@@ -3157,7 +3157,7 @@
         <p:nvSpPr>
           <p:cNvPr id="50178" name="Rectangle 2"/>
           <p:cNvSpPr>
-            <a:spLocks noRot="1" noChangeArrowheads="1" noTextEdit="1"/>
+            <a:spLocks noGrp="1" noRot="1" noChangeAspect="1" noChangeArrowheads="1" noTextEdit="1"/>
           </p:cNvSpPr>
           <p:nvPr>
             <p:ph type="sldImg"/>
@@ -3517,7 +3517,7 @@
       </p:sp>
       <p:sp>
         <p:nvSpPr>
-          <p:cNvPr id="4" name="Rectangle 3"/>
+          <p:cNvPr id="4" name="Slide Number Placeholder 3"/>
           <p:cNvSpPr>
             <a:spLocks noGrp="1" noChangeArrowheads="1"/>
           </p:cNvSpPr>
@@ -3727,7 +3727,7 @@
       </p:sp>
       <p:sp>
         <p:nvSpPr>
-          <p:cNvPr id="5" name="Rectangle 4"/>
+          <p:cNvPr id="5" name="Slide Number Placeholder 4"/>
           <p:cNvSpPr>
             <a:spLocks noGrp="1" noChangeArrowheads="1"/>
           </p:cNvSpPr>
@@ -3937,7 +3937,7 @@
       </p:sp>
       <p:sp>
         <p:nvSpPr>
-          <p:cNvPr id="5" name="Rectangle 4"/>
+          <p:cNvPr id="5" name="Slide Number Placeholder 4"/>
           <p:cNvSpPr>
             <a:spLocks noGrp="1" noChangeArrowheads="1"/>
           </p:cNvSpPr>
@@ -4058,7 +4058,7 @@
       </p:sp>
       <p:sp>
         <p:nvSpPr>
-          <p:cNvPr id="4" name="Rectangle 3"/>
+          <p:cNvPr id="4" name="Slide Number Placeholder 3"/>
           <p:cNvSpPr>
             <a:spLocks noGrp="1" noChangeArrowheads="1"/>
           </p:cNvSpPr>
@@ -4943,9 +4943,28 @@
           <a:p>
             <a:pPr eaLnBrk="1" hangingPunct="1"/>
             <a:r>
-              <a:rPr lang="en-US" smtClean="0"/>
-              <a:t>Serial RapidIO (SRIO) Subsystem</a:t>
-            </a:r>
+              <a:rPr lang="en-US" dirty="0" smtClean="0"/>
+              <a:t>Serial RapidIO (SRIO) </a:t>
+            </a:r>
+            <a:r>
+              <a:rPr lang="en-US" dirty="0" smtClean="0"/>
+              <a:t>Subsystem</a:t>
+            </a:r>
+            <a:br>
+              <a:rPr lang="en-US" dirty="0" smtClean="0"/>
+            </a:br>
+            <a:r>
+              <a:rPr lang="en-US" dirty="0" smtClean="0"/>
+              <a:t/>
+            </a:r>
+            <a:br>
+              <a:rPr lang="en-US" dirty="0" smtClean="0"/>
+            </a:br>
+            <a:r>
+              <a:rPr lang="en-US" sz="1400" dirty="0" smtClean="0"/>
+              <a:t>Ran</a:t>
+            </a:r>
+            <a:endParaRPr lang="en-US" sz="1400" dirty="0" smtClean="0"/>
           </a:p>
         </p:txBody>
       </p:sp>

</xml_diff>